<commit_message>
Add local work illustration
</commit_message>
<xml_diff>
--- a/content/refguide/attachments/version-control/Collaboration Flow.pptx
+++ b/content/refguide/attachments/version-control/Collaboration Flow.pptx
@@ -6,6 +6,7 @@
   </p:sldMasterIdLst>
   <p:sldIdLst>
     <p:sldId id="256" r:id="rId5"/>
+    <p:sldId id="257" r:id="rId6"/>
   </p:sldIdLst>
   <p:sldSz cx="8999538" cy="15840075"/>
   <p:notesSz cx="6858000" cy="9144000"/>
@@ -4848,7 +4849,7 @@
           <a:p>
             <a:fld id="{88067BBD-0E9F-45A8-A3F0-0E6F9916CA42}" type="datetimeFigureOut">
               <a:rPr lang="en-US" smtClean="0"/>
-              <a:t>10/13/2020</a:t>
+              <a:t>11/17/21</a:t>
             </a:fld>
             <a:endParaRPr lang="en-US"/>
           </a:p>
@@ -11726,6 +11727,2084 @@
 </p:sld>
 </file>
 
+<file path=ppt/slides/slide2.xml><?xml version="1.0" encoding="utf-8"?>
+<p:sld xmlns:a="http://schemas.openxmlformats.org/drawingml/2006/main" xmlns:r="http://schemas.openxmlformats.org/officeDocument/2006/relationships" xmlns:p="http://schemas.openxmlformats.org/presentationml/2006/main" showMasterSp="0">
+  <p:cSld>
+    <p:spTree>
+      <p:nvGrpSpPr>
+        <p:cNvPr id="1" name=""/>
+        <p:cNvGrpSpPr/>
+        <p:nvPr/>
+      </p:nvGrpSpPr>
+      <p:grpSpPr>
+        <a:xfrm>
+          <a:off x="0" y="0"/>
+          <a:ext cx="0" cy="0"/>
+          <a:chOff x="0" y="0"/>
+          <a:chExt cx="0" cy="0"/>
+        </a:xfrm>
+      </p:grpSpPr>
+      <p:sp>
+        <p:nvSpPr>
+          <p:cNvPr id="88" name="Rectangle 87">
+            <a:extLst>
+              <a:ext uri="{FF2B5EF4-FFF2-40B4-BE49-F238E27FC236}">
+                <a16:creationId xmlns:a16="http://schemas.microsoft.com/office/drawing/2014/main" id="{3186F894-82E0-4242-80A7-30076C194F16}"/>
+              </a:ext>
+            </a:extLst>
+          </p:cNvPr>
+          <p:cNvSpPr/>
+          <p:nvPr/>
+        </p:nvSpPr>
+        <p:spPr>
+          <a:xfrm>
+            <a:off x="1043769" y="3856125"/>
+            <a:ext cx="5541117" cy="745380"/>
+          </a:xfrm>
+          <a:prstGeom prst="rect">
+            <a:avLst/>
+          </a:prstGeom>
+          <a:noFill/>
+          <a:ln>
+            <a:solidFill>
+              <a:schemeClr val="accent5"/>
+            </a:solidFill>
+            <a:prstDash val="sysDot"/>
+          </a:ln>
+          <a:effectLst/>
+        </p:spPr>
+        <p:style>
+          <a:lnRef idx="2">
+            <a:schemeClr val="accent1">
+              <a:shade val="50000"/>
+            </a:schemeClr>
+          </a:lnRef>
+          <a:fillRef idx="1">
+            <a:schemeClr val="accent1"/>
+          </a:fillRef>
+          <a:effectRef idx="0">
+            <a:schemeClr val="accent1"/>
+          </a:effectRef>
+          <a:fontRef idx="minor">
+            <a:schemeClr val="lt1"/>
+          </a:fontRef>
+        </p:style>
+        <p:txBody>
+          <a:bodyPr rtlCol="0" anchor="ctr"/>
+          <a:lstStyle/>
+          <a:p>
+            <a:pPr algn="ctr"/>
+            <a:endParaRPr lang="en-US"/>
+          </a:p>
+        </p:txBody>
+      </p:sp>
+      <p:cxnSp>
+        <p:nvCxnSpPr>
+          <p:cNvPr id="12" name="Straight Connector 11">
+            <a:extLst>
+              <a:ext uri="{FF2B5EF4-FFF2-40B4-BE49-F238E27FC236}">
+                <a16:creationId xmlns:a16="http://schemas.microsoft.com/office/drawing/2014/main" id="{243E5E72-67B3-42AD-AE38-F451951ED0B0}"/>
+              </a:ext>
+            </a:extLst>
+          </p:cNvPr>
+          <p:cNvCxnSpPr>
+            <a:cxnSpLocks/>
+          </p:cNvCxnSpPr>
+          <p:nvPr/>
+        </p:nvCxnSpPr>
+        <p:spPr>
+          <a:xfrm flipH="1">
+            <a:off x="3775925" y="648037"/>
+            <a:ext cx="15474" cy="6916422"/>
+          </a:xfrm>
+          <a:prstGeom prst="line">
+            <a:avLst/>
+          </a:prstGeom>
+        </p:spPr>
+        <p:style>
+          <a:lnRef idx="1">
+            <a:schemeClr val="accent1"/>
+          </a:lnRef>
+          <a:fillRef idx="0">
+            <a:schemeClr val="accent1"/>
+          </a:fillRef>
+          <a:effectRef idx="0">
+            <a:schemeClr val="accent1"/>
+          </a:effectRef>
+          <a:fontRef idx="minor">
+            <a:schemeClr val="tx1"/>
+          </a:fontRef>
+        </p:style>
+      </p:cxnSp>
+      <p:cxnSp>
+        <p:nvCxnSpPr>
+          <p:cNvPr id="9" name="Straight Connector 8">
+            <a:extLst>
+              <a:ext uri="{FF2B5EF4-FFF2-40B4-BE49-F238E27FC236}">
+                <a16:creationId xmlns:a16="http://schemas.microsoft.com/office/drawing/2014/main" id="{61D725FD-3BCC-498D-A2FA-43F5AEBED228}"/>
+              </a:ext>
+            </a:extLst>
+          </p:cNvPr>
+          <p:cNvCxnSpPr>
+            <a:cxnSpLocks/>
+          </p:cNvCxnSpPr>
+          <p:nvPr/>
+        </p:nvCxnSpPr>
+        <p:spPr>
+          <a:xfrm flipH="1">
+            <a:off x="2345103" y="648037"/>
+            <a:ext cx="66666" cy="6916422"/>
+          </a:xfrm>
+          <a:prstGeom prst="line">
+            <a:avLst/>
+          </a:prstGeom>
+        </p:spPr>
+        <p:style>
+          <a:lnRef idx="1">
+            <a:schemeClr val="accent1"/>
+          </a:lnRef>
+          <a:fillRef idx="0">
+            <a:schemeClr val="accent1"/>
+          </a:fillRef>
+          <a:effectRef idx="0">
+            <a:schemeClr val="accent1"/>
+          </a:effectRef>
+          <a:fontRef idx="minor">
+            <a:schemeClr val="tx1"/>
+          </a:fontRef>
+        </p:style>
+      </p:cxnSp>
+      <p:cxnSp>
+        <p:nvCxnSpPr>
+          <p:cNvPr id="13" name="Straight Connector 12">
+            <a:extLst>
+              <a:ext uri="{FF2B5EF4-FFF2-40B4-BE49-F238E27FC236}">
+                <a16:creationId xmlns:a16="http://schemas.microsoft.com/office/drawing/2014/main" id="{908D8870-8A84-4C5E-8A13-B1467BD42DAB}"/>
+              </a:ext>
+            </a:extLst>
+          </p:cNvPr>
+          <p:cNvCxnSpPr>
+            <a:cxnSpLocks/>
+          </p:cNvCxnSpPr>
+          <p:nvPr/>
+        </p:nvCxnSpPr>
+        <p:spPr>
+          <a:xfrm flipH="1">
+            <a:off x="5223614" y="648037"/>
+            <a:ext cx="7944" cy="6916422"/>
+          </a:xfrm>
+          <a:prstGeom prst="line">
+            <a:avLst/>
+          </a:prstGeom>
+        </p:spPr>
+        <p:style>
+          <a:lnRef idx="1">
+            <a:schemeClr val="accent1"/>
+          </a:lnRef>
+          <a:fillRef idx="0">
+            <a:schemeClr val="accent1"/>
+          </a:fillRef>
+          <a:effectRef idx="0">
+            <a:schemeClr val="accent1"/>
+          </a:effectRef>
+          <a:fontRef idx="minor">
+            <a:schemeClr val="tx1"/>
+          </a:fontRef>
+        </p:style>
+      </p:cxnSp>
+      <p:sp>
+        <p:nvSpPr>
+          <p:cNvPr id="4" name="TextBox 3">
+            <a:extLst>
+              <a:ext uri="{FF2B5EF4-FFF2-40B4-BE49-F238E27FC236}">
+                <a16:creationId xmlns:a16="http://schemas.microsoft.com/office/drawing/2014/main" id="{6D4E0301-1CB2-4B3F-9FA5-6DC74425615E}"/>
+              </a:ext>
+            </a:extLst>
+          </p:cNvPr>
+          <p:cNvSpPr txBox="1"/>
+          <p:nvPr/>
+        </p:nvSpPr>
+        <p:spPr>
+          <a:xfrm>
+            <a:off x="904940" y="653120"/>
+            <a:ext cx="1440160" cy="646331"/>
+          </a:xfrm>
+          <a:prstGeom prst="rect">
+            <a:avLst/>
+          </a:prstGeom>
+          <a:noFill/>
+        </p:spPr>
+        <p:txBody>
+          <a:bodyPr wrap="square" rtlCol="0">
+            <a:spAutoFit/>
+          </a:bodyPr>
+          <a:lstStyle/>
+          <a:p>
+            <a:pPr algn="ctr"/>
+            <a:r>
+              <a:rPr lang="en-US" dirty="0"/>
+              <a:t>Studio</a:t>
+            </a:r>
+            <a:br>
+              <a:rPr lang="en-US" dirty="0"/>
+            </a:br>
+            <a:r>
+              <a:rPr lang="en-US" dirty="0"/>
+              <a:t>Pro</a:t>
+            </a:r>
+          </a:p>
+        </p:txBody>
+      </p:sp>
+      <p:sp>
+        <p:nvSpPr>
+          <p:cNvPr id="5" name="TextBox 4">
+            <a:extLst>
+              <a:ext uri="{FF2B5EF4-FFF2-40B4-BE49-F238E27FC236}">
+                <a16:creationId xmlns:a16="http://schemas.microsoft.com/office/drawing/2014/main" id="{0F5F21DB-9438-4775-9C97-2FF27C70E03B}"/>
+              </a:ext>
+            </a:extLst>
+          </p:cNvPr>
+          <p:cNvSpPr txBox="1"/>
+          <p:nvPr/>
+        </p:nvSpPr>
+        <p:spPr>
+          <a:xfrm>
+            <a:off x="5223614" y="648037"/>
+            <a:ext cx="1440160" cy="646331"/>
+          </a:xfrm>
+          <a:prstGeom prst="rect">
+            <a:avLst/>
+          </a:prstGeom>
+          <a:noFill/>
+        </p:spPr>
+        <p:txBody>
+          <a:bodyPr wrap="square" rtlCol="0">
+            <a:spAutoFit/>
+          </a:bodyPr>
+          <a:lstStyle/>
+          <a:p>
+            <a:pPr algn="ctr"/>
+            <a:r>
+              <a:rPr lang="en-US" dirty="0"/>
+              <a:t>Team</a:t>
+            </a:r>
+            <a:br>
+              <a:rPr lang="en-US" dirty="0"/>
+            </a:br>
+            <a:r>
+              <a:rPr lang="en-US" dirty="0"/>
+              <a:t>Server</a:t>
+            </a:r>
+          </a:p>
+        </p:txBody>
+      </p:sp>
+      <p:sp>
+        <p:nvSpPr>
+          <p:cNvPr id="6" name="TextBox 5">
+            <a:extLst>
+              <a:ext uri="{FF2B5EF4-FFF2-40B4-BE49-F238E27FC236}">
+                <a16:creationId xmlns:a16="http://schemas.microsoft.com/office/drawing/2014/main" id="{D2DD3BAF-63D3-4EE8-92A1-31E73F51A07F}"/>
+              </a:ext>
+            </a:extLst>
+          </p:cNvPr>
+          <p:cNvSpPr txBox="1"/>
+          <p:nvPr/>
+        </p:nvSpPr>
+        <p:spPr>
+          <a:xfrm>
+            <a:off x="3791398" y="648037"/>
+            <a:ext cx="1440160" cy="646331"/>
+          </a:xfrm>
+          <a:prstGeom prst="rect">
+            <a:avLst/>
+          </a:prstGeom>
+          <a:noFill/>
+        </p:spPr>
+        <p:txBody>
+          <a:bodyPr wrap="square" rtlCol="0">
+            <a:spAutoFit/>
+          </a:bodyPr>
+          <a:lstStyle/>
+          <a:p>
+            <a:pPr algn="ctr"/>
+            <a:r>
+              <a:rPr lang="en-US" dirty="0"/>
+              <a:t>Local</a:t>
+            </a:r>
+            <a:br>
+              <a:rPr lang="en-US" dirty="0"/>
+            </a:br>
+            <a:r>
+              <a:rPr lang="en-US" dirty="0"/>
+              <a:t>Repository</a:t>
+            </a:r>
+          </a:p>
+        </p:txBody>
+      </p:sp>
+      <p:sp>
+        <p:nvSpPr>
+          <p:cNvPr id="7" name="TextBox 6">
+            <a:extLst>
+              <a:ext uri="{FF2B5EF4-FFF2-40B4-BE49-F238E27FC236}">
+                <a16:creationId xmlns:a16="http://schemas.microsoft.com/office/drawing/2014/main" id="{D7BA306D-2BE3-46E1-AE07-AF3EA4C5BF83}"/>
+              </a:ext>
+            </a:extLst>
+          </p:cNvPr>
+          <p:cNvSpPr txBox="1"/>
+          <p:nvPr/>
+        </p:nvSpPr>
+        <p:spPr>
+          <a:xfrm>
+            <a:off x="2341820" y="652996"/>
+            <a:ext cx="1440160" cy="646331"/>
+          </a:xfrm>
+          <a:prstGeom prst="rect">
+            <a:avLst/>
+          </a:prstGeom>
+          <a:noFill/>
+        </p:spPr>
+        <p:txBody>
+          <a:bodyPr wrap="square" rtlCol="0">
+            <a:spAutoFit/>
+          </a:bodyPr>
+          <a:lstStyle/>
+          <a:p>
+            <a:pPr algn="ctr"/>
+            <a:r>
+              <a:rPr lang="en-US" dirty="0"/>
+              <a:t>Local</a:t>
+            </a:r>
+            <a:br>
+              <a:rPr lang="en-US" dirty="0"/>
+            </a:br>
+            <a:r>
+              <a:rPr lang="en-US" dirty="0"/>
+              <a:t>Model</a:t>
+            </a:r>
+          </a:p>
+        </p:txBody>
+      </p:sp>
+      <p:sp>
+        <p:nvSpPr>
+          <p:cNvPr id="16" name="Rectangle 15">
+            <a:extLst>
+              <a:ext uri="{FF2B5EF4-FFF2-40B4-BE49-F238E27FC236}">
+                <a16:creationId xmlns:a16="http://schemas.microsoft.com/office/drawing/2014/main" id="{7872B695-CE25-4F10-98D3-5A2C89CC28A5}"/>
+              </a:ext>
+            </a:extLst>
+          </p:cNvPr>
+          <p:cNvSpPr/>
+          <p:nvPr/>
+        </p:nvSpPr>
+        <p:spPr>
+          <a:xfrm>
+            <a:off x="2697913" y="4051928"/>
+            <a:ext cx="720076" cy="360040"/>
+          </a:xfrm>
+          <a:prstGeom prst="rect">
+            <a:avLst/>
+          </a:prstGeom>
+        </p:spPr>
+        <p:style>
+          <a:lnRef idx="2">
+            <a:schemeClr val="accent1">
+              <a:shade val="50000"/>
+            </a:schemeClr>
+          </a:lnRef>
+          <a:fillRef idx="1">
+            <a:schemeClr val="accent1"/>
+          </a:fillRef>
+          <a:effectRef idx="0">
+            <a:schemeClr val="accent1"/>
+          </a:effectRef>
+          <a:fontRef idx="minor">
+            <a:schemeClr val="lt1"/>
+          </a:fontRef>
+        </p:style>
+        <p:txBody>
+          <a:bodyPr rot="0" spcFirstLastPara="0" vertOverflow="overflow" horzOverflow="overflow" vert="horz" wrap="square" lIns="91440" tIns="45720" rIns="91440" bIns="45720" numCol="1" spcCol="0" rtlCol="0" fromWordArt="0" anchor="ctr" anchorCtr="0" forceAA="0" compatLnSpc="1">
+            <a:prstTxWarp prst="textNoShape">
+              <a:avLst/>
+            </a:prstTxWarp>
+            <a:noAutofit/>
+          </a:bodyPr>
+          <a:lstStyle/>
+          <a:p>
+            <a:pPr algn="ctr"/>
+            <a:r>
+              <a:rPr lang="en-US" dirty="0"/>
+              <a:t>2</a:t>
+            </a:r>
+          </a:p>
+        </p:txBody>
+      </p:sp>
+      <p:sp>
+        <p:nvSpPr>
+          <p:cNvPr id="20" name="Rectangle 19">
+            <a:extLst>
+              <a:ext uri="{FF2B5EF4-FFF2-40B4-BE49-F238E27FC236}">
+                <a16:creationId xmlns:a16="http://schemas.microsoft.com/office/drawing/2014/main" id="{2905DA7F-7362-41A2-BB1E-0C13127143D7}"/>
+              </a:ext>
+            </a:extLst>
+          </p:cNvPr>
+          <p:cNvSpPr/>
+          <p:nvPr/>
+        </p:nvSpPr>
+        <p:spPr>
+          <a:xfrm>
+            <a:off x="1271124" y="2969187"/>
+            <a:ext cx="727806" cy="716033"/>
+          </a:xfrm>
+          <a:prstGeom prst="rect">
+            <a:avLst/>
+          </a:prstGeom>
+          <a:solidFill>
+            <a:schemeClr val="accent2"/>
+          </a:solidFill>
+        </p:spPr>
+        <p:style>
+          <a:lnRef idx="2">
+            <a:schemeClr val="accent1">
+              <a:shade val="50000"/>
+            </a:schemeClr>
+          </a:lnRef>
+          <a:fillRef idx="1">
+            <a:schemeClr val="accent1"/>
+          </a:fillRef>
+          <a:effectRef idx="0">
+            <a:schemeClr val="accent1"/>
+          </a:effectRef>
+          <a:fontRef idx="minor">
+            <a:schemeClr val="lt1"/>
+          </a:fontRef>
+        </p:style>
+        <p:txBody>
+          <a:bodyPr rot="0" spcFirstLastPara="0" vertOverflow="overflow" horzOverflow="overflow" vert="horz" wrap="square" lIns="91440" tIns="45720" rIns="91440" bIns="45720" numCol="1" spcCol="0" rtlCol="0" fromWordArt="0" anchor="ctr" anchorCtr="0" forceAA="0" compatLnSpc="1">
+            <a:prstTxWarp prst="textNoShape">
+              <a:avLst/>
+            </a:prstTxWarp>
+            <a:noAutofit/>
+          </a:bodyPr>
+          <a:lstStyle/>
+          <a:p>
+            <a:pPr algn="ctr"/>
+            <a:r>
+              <a:rPr lang="en-US" sz="1100" dirty="0"/>
+              <a:t>Develop</a:t>
+            </a:r>
+          </a:p>
+        </p:txBody>
+      </p:sp>
+      <p:sp>
+        <p:nvSpPr>
+          <p:cNvPr id="19" name="Rectangle 18">
+            <a:extLst>
+              <a:ext uri="{FF2B5EF4-FFF2-40B4-BE49-F238E27FC236}">
+                <a16:creationId xmlns:a16="http://schemas.microsoft.com/office/drawing/2014/main" id="{E6A519E3-8192-49AD-B9A6-742A43CB7069}"/>
+              </a:ext>
+            </a:extLst>
+          </p:cNvPr>
+          <p:cNvSpPr/>
+          <p:nvPr/>
+        </p:nvSpPr>
+        <p:spPr>
+          <a:xfrm>
+            <a:off x="2699616" y="2973798"/>
+            <a:ext cx="720076" cy="717440"/>
+          </a:xfrm>
+          <a:prstGeom prst="rect">
+            <a:avLst/>
+          </a:prstGeom>
+          <a:pattFill prst="dkHorz">
+            <a:fgClr>
+              <a:schemeClr val="accent1"/>
+            </a:fgClr>
+            <a:bgClr>
+              <a:schemeClr val="bg1"/>
+            </a:bgClr>
+          </a:pattFill>
+        </p:spPr>
+        <p:style>
+          <a:lnRef idx="2">
+            <a:schemeClr val="accent1">
+              <a:shade val="50000"/>
+            </a:schemeClr>
+          </a:lnRef>
+          <a:fillRef idx="1">
+            <a:schemeClr val="accent1"/>
+          </a:fillRef>
+          <a:effectRef idx="0">
+            <a:schemeClr val="accent1"/>
+          </a:effectRef>
+          <a:fontRef idx="minor">
+            <a:schemeClr val="lt1"/>
+          </a:fontRef>
+        </p:style>
+        <p:txBody>
+          <a:bodyPr rot="0" spcFirstLastPara="0" vertOverflow="overflow" horzOverflow="overflow" vert="horz" wrap="square" lIns="91440" tIns="45720" rIns="91440" bIns="45720" numCol="1" spcCol="0" rtlCol="0" fromWordArt="0" anchor="ctr" anchorCtr="0" forceAA="0" compatLnSpc="1">
+            <a:prstTxWarp prst="textNoShape">
+              <a:avLst/>
+            </a:prstTxWarp>
+            <a:noAutofit/>
+          </a:bodyPr>
+          <a:lstStyle/>
+          <a:p>
+            <a:pPr algn="ctr"/>
+            <a:endParaRPr lang="en-US" dirty="0"/>
+          </a:p>
+        </p:txBody>
+      </p:sp>
+      <p:sp>
+        <p:nvSpPr>
+          <p:cNvPr id="25" name="Rectangle 24">
+            <a:extLst>
+              <a:ext uri="{FF2B5EF4-FFF2-40B4-BE49-F238E27FC236}">
+                <a16:creationId xmlns:a16="http://schemas.microsoft.com/office/drawing/2014/main" id="{B6C0A4F5-3309-488C-86B0-EA4B09D48A42}"/>
+              </a:ext>
+            </a:extLst>
+          </p:cNvPr>
+          <p:cNvSpPr/>
+          <p:nvPr/>
+        </p:nvSpPr>
+        <p:spPr>
+          <a:xfrm>
+            <a:off x="4150382" y="4047696"/>
+            <a:ext cx="720076" cy="360040"/>
+          </a:xfrm>
+          <a:prstGeom prst="rect">
+            <a:avLst/>
+          </a:prstGeom>
+        </p:spPr>
+        <p:style>
+          <a:lnRef idx="2">
+            <a:schemeClr val="accent1">
+              <a:shade val="50000"/>
+            </a:schemeClr>
+          </a:lnRef>
+          <a:fillRef idx="1">
+            <a:schemeClr val="accent1"/>
+          </a:fillRef>
+          <a:effectRef idx="0">
+            <a:schemeClr val="accent1"/>
+          </a:effectRef>
+          <a:fontRef idx="minor">
+            <a:schemeClr val="lt1"/>
+          </a:fontRef>
+        </p:style>
+        <p:txBody>
+          <a:bodyPr rot="0" spcFirstLastPara="0" vertOverflow="overflow" horzOverflow="overflow" vert="horz" wrap="square" lIns="91440" tIns="45720" rIns="91440" bIns="45720" numCol="1" spcCol="0" rtlCol="0" fromWordArt="0" anchor="ctr" anchorCtr="0" forceAA="0" compatLnSpc="1">
+            <a:prstTxWarp prst="textNoShape">
+              <a:avLst/>
+            </a:prstTxWarp>
+            <a:noAutofit/>
+          </a:bodyPr>
+          <a:lstStyle/>
+          <a:p>
+            <a:pPr algn="ctr"/>
+            <a:r>
+              <a:rPr lang="en-US" dirty="0"/>
+              <a:t>2</a:t>
+            </a:r>
+          </a:p>
+        </p:txBody>
+      </p:sp>
+      <p:cxnSp>
+        <p:nvCxnSpPr>
+          <p:cNvPr id="79" name="Straight Arrow Connector 78">
+            <a:extLst>
+              <a:ext uri="{FF2B5EF4-FFF2-40B4-BE49-F238E27FC236}">
+                <a16:creationId xmlns:a16="http://schemas.microsoft.com/office/drawing/2014/main" id="{5486C6E3-63BE-403E-AD9D-3F34A1E29A24}"/>
+              </a:ext>
+            </a:extLst>
+          </p:cNvPr>
+          <p:cNvCxnSpPr>
+            <a:cxnSpLocks/>
+            <a:endCxn id="19" idx="0"/>
+          </p:cNvCxnSpPr>
+          <p:nvPr/>
+        </p:nvCxnSpPr>
+        <p:spPr>
+          <a:xfrm>
+            <a:off x="3059654" y="2610190"/>
+            <a:ext cx="0" cy="363608"/>
+          </a:xfrm>
+          <a:prstGeom prst="straightConnector1">
+            <a:avLst/>
+          </a:prstGeom>
+          <a:ln>
+            <a:tailEnd type="triangle"/>
+          </a:ln>
+        </p:spPr>
+        <p:style>
+          <a:lnRef idx="3">
+            <a:schemeClr val="accent1"/>
+          </a:lnRef>
+          <a:fillRef idx="0">
+            <a:schemeClr val="accent1"/>
+          </a:fillRef>
+          <a:effectRef idx="2">
+            <a:schemeClr val="accent1"/>
+          </a:effectRef>
+          <a:fontRef idx="minor">
+            <a:schemeClr val="tx1"/>
+          </a:fontRef>
+        </p:style>
+      </p:cxnSp>
+      <p:cxnSp>
+        <p:nvCxnSpPr>
+          <p:cNvPr id="80" name="Straight Arrow Connector 79">
+            <a:extLst>
+              <a:ext uri="{FF2B5EF4-FFF2-40B4-BE49-F238E27FC236}">
+                <a16:creationId xmlns:a16="http://schemas.microsoft.com/office/drawing/2014/main" id="{1795B8A6-44B4-4BB3-9CAD-CF499404ABF9}"/>
+              </a:ext>
+            </a:extLst>
+          </p:cNvPr>
+          <p:cNvCxnSpPr>
+            <a:cxnSpLocks/>
+          </p:cNvCxnSpPr>
+          <p:nvPr/>
+        </p:nvCxnSpPr>
+        <p:spPr>
+          <a:xfrm>
+            <a:off x="3057951" y="3692456"/>
+            <a:ext cx="0" cy="360036"/>
+          </a:xfrm>
+          <a:prstGeom prst="straightConnector1">
+            <a:avLst/>
+          </a:prstGeom>
+          <a:ln>
+            <a:tailEnd type="triangle"/>
+          </a:ln>
+        </p:spPr>
+        <p:style>
+          <a:lnRef idx="3">
+            <a:schemeClr val="accent1"/>
+          </a:lnRef>
+          <a:fillRef idx="0">
+            <a:schemeClr val="accent1"/>
+          </a:fillRef>
+          <a:effectRef idx="2">
+            <a:schemeClr val="accent1"/>
+          </a:effectRef>
+          <a:fontRef idx="minor">
+            <a:schemeClr val="tx1"/>
+          </a:fontRef>
+        </p:style>
+      </p:cxnSp>
+      <p:sp>
+        <p:nvSpPr>
+          <p:cNvPr id="133" name="TextBox 132">
+            <a:extLst>
+              <a:ext uri="{FF2B5EF4-FFF2-40B4-BE49-F238E27FC236}">
+                <a16:creationId xmlns:a16="http://schemas.microsoft.com/office/drawing/2014/main" id="{F43B5E18-BDCA-42E2-9554-C7F130A442CD}"/>
+              </a:ext>
+            </a:extLst>
+          </p:cNvPr>
+          <p:cNvSpPr txBox="1"/>
+          <p:nvPr/>
+        </p:nvSpPr>
+        <p:spPr>
+          <a:xfrm>
+            <a:off x="1286434" y="3999034"/>
+            <a:ext cx="720066" cy="461665"/>
+          </a:xfrm>
+          <a:prstGeom prst="rect">
+            <a:avLst/>
+          </a:prstGeom>
+          <a:noFill/>
+        </p:spPr>
+        <p:txBody>
+          <a:bodyPr wrap="square" rtlCol="0">
+            <a:spAutoFit/>
+          </a:bodyPr>
+          <a:lstStyle/>
+          <a:p>
+            <a:pPr algn="ctr"/>
+            <a:r>
+              <a:rPr lang="en-US" sz="1200" dirty="0">
+                <a:solidFill>
+                  <a:schemeClr val="accent1"/>
+                </a:solidFill>
+              </a:rPr>
+              <a:t>Commit &amp; Push</a:t>
+            </a:r>
+          </a:p>
+        </p:txBody>
+      </p:sp>
+      <p:sp>
+        <p:nvSpPr>
+          <p:cNvPr id="101" name="Rectangle 100">
+            <a:extLst>
+              <a:ext uri="{FF2B5EF4-FFF2-40B4-BE49-F238E27FC236}">
+                <a16:creationId xmlns:a16="http://schemas.microsoft.com/office/drawing/2014/main" id="{F288ECD4-D976-FE4F-B599-0D4B9B2C7FBC}"/>
+              </a:ext>
+            </a:extLst>
+          </p:cNvPr>
+          <p:cNvSpPr/>
+          <p:nvPr/>
+        </p:nvSpPr>
+        <p:spPr>
+          <a:xfrm>
+            <a:off x="1271124" y="2068976"/>
+            <a:ext cx="727806" cy="716033"/>
+          </a:xfrm>
+          <a:prstGeom prst="rect">
+            <a:avLst/>
+          </a:prstGeom>
+          <a:solidFill>
+            <a:schemeClr val="accent2"/>
+          </a:solidFill>
+        </p:spPr>
+        <p:style>
+          <a:lnRef idx="2">
+            <a:schemeClr val="accent1">
+              <a:shade val="50000"/>
+            </a:schemeClr>
+          </a:lnRef>
+          <a:fillRef idx="1">
+            <a:schemeClr val="accent1"/>
+          </a:fillRef>
+          <a:effectRef idx="0">
+            <a:schemeClr val="accent1"/>
+          </a:effectRef>
+          <a:fontRef idx="minor">
+            <a:schemeClr val="lt1"/>
+          </a:fontRef>
+        </p:style>
+        <p:txBody>
+          <a:bodyPr rot="0" spcFirstLastPara="0" vertOverflow="overflow" horzOverflow="overflow" vert="horz" wrap="square" lIns="91440" tIns="45720" rIns="91440" bIns="45720" numCol="1" spcCol="0" rtlCol="0" fromWordArt="0" anchor="ctr" anchorCtr="0" forceAA="0" compatLnSpc="1">
+            <a:prstTxWarp prst="textNoShape">
+              <a:avLst/>
+            </a:prstTxWarp>
+            <a:noAutofit/>
+          </a:bodyPr>
+          <a:lstStyle/>
+          <a:p>
+            <a:pPr algn="ctr"/>
+            <a:r>
+              <a:rPr lang="en-US" sz="1100" dirty="0"/>
+              <a:t>Create</a:t>
+            </a:r>
+          </a:p>
+          <a:p>
+            <a:pPr algn="ctr"/>
+            <a:r>
+              <a:rPr lang="en-US" sz="1100" dirty="0"/>
+              <a:t>App</a:t>
+            </a:r>
+          </a:p>
+        </p:txBody>
+      </p:sp>
+      <p:sp>
+        <p:nvSpPr>
+          <p:cNvPr id="109" name="Rectangle 108">
+            <a:extLst>
+              <a:ext uri="{FF2B5EF4-FFF2-40B4-BE49-F238E27FC236}">
+                <a16:creationId xmlns:a16="http://schemas.microsoft.com/office/drawing/2014/main" id="{1040E658-847C-3C4B-97F6-E20F5C9D5115}"/>
+              </a:ext>
+            </a:extLst>
+          </p:cNvPr>
+          <p:cNvSpPr/>
+          <p:nvPr/>
+        </p:nvSpPr>
+        <p:spPr>
+          <a:xfrm>
+            <a:off x="2708431" y="2242330"/>
+            <a:ext cx="720076" cy="360040"/>
+          </a:xfrm>
+          <a:prstGeom prst="rect">
+            <a:avLst/>
+          </a:prstGeom>
+        </p:spPr>
+        <p:style>
+          <a:lnRef idx="2">
+            <a:schemeClr val="accent1">
+              <a:shade val="50000"/>
+            </a:schemeClr>
+          </a:lnRef>
+          <a:fillRef idx="1">
+            <a:schemeClr val="accent1"/>
+          </a:fillRef>
+          <a:effectRef idx="0">
+            <a:schemeClr val="accent1"/>
+          </a:effectRef>
+          <a:fontRef idx="minor">
+            <a:schemeClr val="lt1"/>
+          </a:fontRef>
+        </p:style>
+        <p:txBody>
+          <a:bodyPr rot="0" spcFirstLastPara="0" vertOverflow="overflow" horzOverflow="overflow" vert="horz" wrap="square" lIns="91440" tIns="45720" rIns="91440" bIns="45720" numCol="1" spcCol="0" rtlCol="0" fromWordArt="0" anchor="ctr" anchorCtr="0" forceAA="0" compatLnSpc="1">
+            <a:prstTxWarp prst="textNoShape">
+              <a:avLst/>
+            </a:prstTxWarp>
+            <a:noAutofit/>
+          </a:bodyPr>
+          <a:lstStyle/>
+          <a:p>
+            <a:pPr algn="ctr"/>
+            <a:r>
+              <a:rPr lang="en-US" dirty="0"/>
+              <a:t>1</a:t>
+            </a:r>
+          </a:p>
+        </p:txBody>
+      </p:sp>
+      <p:sp>
+        <p:nvSpPr>
+          <p:cNvPr id="110" name="Rectangle 109">
+            <a:extLst>
+              <a:ext uri="{FF2B5EF4-FFF2-40B4-BE49-F238E27FC236}">
+                <a16:creationId xmlns:a16="http://schemas.microsoft.com/office/drawing/2014/main" id="{F3BAB6A8-169C-E34F-811B-6F3D78B10619}"/>
+              </a:ext>
+            </a:extLst>
+          </p:cNvPr>
+          <p:cNvSpPr/>
+          <p:nvPr/>
+        </p:nvSpPr>
+        <p:spPr>
+          <a:xfrm>
+            <a:off x="4147473" y="2239512"/>
+            <a:ext cx="720076" cy="360040"/>
+          </a:xfrm>
+          <a:prstGeom prst="rect">
+            <a:avLst/>
+          </a:prstGeom>
+        </p:spPr>
+        <p:style>
+          <a:lnRef idx="2">
+            <a:schemeClr val="accent1">
+              <a:shade val="50000"/>
+            </a:schemeClr>
+          </a:lnRef>
+          <a:fillRef idx="1">
+            <a:schemeClr val="accent1"/>
+          </a:fillRef>
+          <a:effectRef idx="0">
+            <a:schemeClr val="accent1"/>
+          </a:effectRef>
+          <a:fontRef idx="minor">
+            <a:schemeClr val="lt1"/>
+          </a:fontRef>
+        </p:style>
+        <p:txBody>
+          <a:bodyPr rot="0" spcFirstLastPara="0" vertOverflow="overflow" horzOverflow="overflow" vert="horz" wrap="square" lIns="91440" tIns="45720" rIns="91440" bIns="45720" numCol="1" spcCol="0" rtlCol="0" fromWordArt="0" anchor="ctr" anchorCtr="0" forceAA="0" compatLnSpc="1">
+            <a:prstTxWarp prst="textNoShape">
+              <a:avLst/>
+            </a:prstTxWarp>
+            <a:noAutofit/>
+          </a:bodyPr>
+          <a:lstStyle/>
+          <a:p>
+            <a:pPr algn="ctr"/>
+            <a:r>
+              <a:rPr lang="en-US" dirty="0"/>
+              <a:t>1</a:t>
+            </a:r>
+          </a:p>
+        </p:txBody>
+      </p:sp>
+      <p:sp>
+        <p:nvSpPr>
+          <p:cNvPr id="111" name="Rectangle 110">
+            <a:extLst>
+              <a:ext uri="{FF2B5EF4-FFF2-40B4-BE49-F238E27FC236}">
+                <a16:creationId xmlns:a16="http://schemas.microsoft.com/office/drawing/2014/main" id="{364ACEA4-190A-2043-9681-6FBD106A0D7D}"/>
+              </a:ext>
+            </a:extLst>
+          </p:cNvPr>
+          <p:cNvSpPr/>
+          <p:nvPr/>
+        </p:nvSpPr>
+        <p:spPr>
+          <a:xfrm>
+            <a:off x="5579689" y="2242541"/>
+            <a:ext cx="720076" cy="360040"/>
+          </a:xfrm>
+          <a:prstGeom prst="rect">
+            <a:avLst/>
+          </a:prstGeom>
+        </p:spPr>
+        <p:style>
+          <a:lnRef idx="2">
+            <a:schemeClr val="accent1">
+              <a:shade val="50000"/>
+            </a:schemeClr>
+          </a:lnRef>
+          <a:fillRef idx="1">
+            <a:schemeClr val="accent1"/>
+          </a:fillRef>
+          <a:effectRef idx="0">
+            <a:schemeClr val="accent1"/>
+          </a:effectRef>
+          <a:fontRef idx="minor">
+            <a:schemeClr val="lt1"/>
+          </a:fontRef>
+        </p:style>
+        <p:txBody>
+          <a:bodyPr rot="0" spcFirstLastPara="0" vertOverflow="overflow" horzOverflow="overflow" vert="horz" wrap="square" lIns="91440" tIns="45720" rIns="91440" bIns="45720" numCol="1" spcCol="0" rtlCol="0" fromWordArt="0" anchor="ctr" anchorCtr="0" forceAA="0" compatLnSpc="1">
+            <a:prstTxWarp prst="textNoShape">
+              <a:avLst/>
+            </a:prstTxWarp>
+            <a:noAutofit/>
+          </a:bodyPr>
+          <a:lstStyle/>
+          <a:p>
+            <a:pPr algn="ctr"/>
+            <a:r>
+              <a:rPr lang="en-US" dirty="0"/>
+              <a:t>1</a:t>
+            </a:r>
+          </a:p>
+        </p:txBody>
+      </p:sp>
+      <p:cxnSp>
+        <p:nvCxnSpPr>
+          <p:cNvPr id="112" name="Straight Arrow Connector 111">
+            <a:extLst>
+              <a:ext uri="{FF2B5EF4-FFF2-40B4-BE49-F238E27FC236}">
+                <a16:creationId xmlns:a16="http://schemas.microsoft.com/office/drawing/2014/main" id="{428E135D-B5FE-724D-8B68-FE5C1E88E82E}"/>
+              </a:ext>
+            </a:extLst>
+          </p:cNvPr>
+          <p:cNvCxnSpPr/>
+          <p:nvPr/>
+        </p:nvCxnSpPr>
+        <p:spPr>
+          <a:xfrm>
+            <a:off x="1998001" y="2425393"/>
+            <a:ext cx="716191" cy="703"/>
+          </a:xfrm>
+          <a:prstGeom prst="straightConnector1">
+            <a:avLst/>
+          </a:prstGeom>
+          <a:ln>
+            <a:headEnd type="none" w="med" len="med"/>
+            <a:tailEnd type="triangle" w="med" len="med"/>
+          </a:ln>
+        </p:spPr>
+        <p:style>
+          <a:lnRef idx="3">
+            <a:schemeClr val="accent1"/>
+          </a:lnRef>
+          <a:fillRef idx="0">
+            <a:schemeClr val="accent1"/>
+          </a:fillRef>
+          <a:effectRef idx="2">
+            <a:schemeClr val="accent1"/>
+          </a:effectRef>
+          <a:fontRef idx="minor">
+            <a:schemeClr val="tx1"/>
+          </a:fontRef>
+        </p:style>
+      </p:cxnSp>
+      <p:cxnSp>
+        <p:nvCxnSpPr>
+          <p:cNvPr id="113" name="Straight Arrow Connector 112">
+            <a:extLst>
+              <a:ext uri="{FF2B5EF4-FFF2-40B4-BE49-F238E27FC236}">
+                <a16:creationId xmlns:a16="http://schemas.microsoft.com/office/drawing/2014/main" id="{45E0724B-1F7B-1942-9374-E9F34AA77BBB}"/>
+              </a:ext>
+            </a:extLst>
+          </p:cNvPr>
+          <p:cNvCxnSpPr>
+            <a:cxnSpLocks/>
+          </p:cNvCxnSpPr>
+          <p:nvPr/>
+        </p:nvCxnSpPr>
+        <p:spPr>
+          <a:xfrm>
+            <a:off x="3427366" y="2426096"/>
+            <a:ext cx="717103" cy="0"/>
+          </a:xfrm>
+          <a:prstGeom prst="straightConnector1">
+            <a:avLst/>
+          </a:prstGeom>
+          <a:ln>
+            <a:tailEnd type="triangle"/>
+          </a:ln>
+        </p:spPr>
+        <p:style>
+          <a:lnRef idx="3">
+            <a:schemeClr val="accent1"/>
+          </a:lnRef>
+          <a:fillRef idx="0">
+            <a:schemeClr val="accent1"/>
+          </a:fillRef>
+          <a:effectRef idx="2">
+            <a:schemeClr val="accent1"/>
+          </a:effectRef>
+          <a:fontRef idx="minor">
+            <a:schemeClr val="tx1"/>
+          </a:fontRef>
+        </p:style>
+      </p:cxnSp>
+      <p:cxnSp>
+        <p:nvCxnSpPr>
+          <p:cNvPr id="114" name="Straight Arrow Connector 113">
+            <a:extLst>
+              <a:ext uri="{FF2B5EF4-FFF2-40B4-BE49-F238E27FC236}">
+                <a16:creationId xmlns:a16="http://schemas.microsoft.com/office/drawing/2014/main" id="{0A64716C-2B69-8F43-90C5-E3890D7B5177}"/>
+              </a:ext>
+            </a:extLst>
+          </p:cNvPr>
+          <p:cNvCxnSpPr>
+            <a:cxnSpLocks/>
+          </p:cNvCxnSpPr>
+          <p:nvPr/>
+        </p:nvCxnSpPr>
+        <p:spPr>
+          <a:xfrm>
+            <a:off x="4868062" y="2426096"/>
+            <a:ext cx="717103" cy="0"/>
+          </a:xfrm>
+          <a:prstGeom prst="straightConnector1">
+            <a:avLst/>
+          </a:prstGeom>
+          <a:ln>
+            <a:tailEnd type="triangle"/>
+          </a:ln>
+        </p:spPr>
+        <p:style>
+          <a:lnRef idx="3">
+            <a:schemeClr val="accent1"/>
+          </a:lnRef>
+          <a:fillRef idx="0">
+            <a:schemeClr val="accent1"/>
+          </a:fillRef>
+          <a:effectRef idx="2">
+            <a:schemeClr val="accent1"/>
+          </a:effectRef>
+          <a:fontRef idx="minor">
+            <a:schemeClr val="tx1"/>
+          </a:fontRef>
+        </p:style>
+      </p:cxnSp>
+      <p:cxnSp>
+        <p:nvCxnSpPr>
+          <p:cNvPr id="119" name="Straight Arrow Connector 118">
+            <a:extLst>
+              <a:ext uri="{FF2B5EF4-FFF2-40B4-BE49-F238E27FC236}">
+                <a16:creationId xmlns:a16="http://schemas.microsoft.com/office/drawing/2014/main" id="{B82A76B9-2145-0E4D-B6F4-5ABD5B9B6D8C}"/>
+              </a:ext>
+            </a:extLst>
+          </p:cNvPr>
+          <p:cNvCxnSpPr>
+            <a:cxnSpLocks/>
+            <a:stCxn id="20" idx="3"/>
+            <a:endCxn id="19" idx="1"/>
+          </p:cNvCxnSpPr>
+          <p:nvPr/>
+        </p:nvCxnSpPr>
+        <p:spPr>
+          <a:xfrm>
+            <a:off x="1998930" y="3327204"/>
+            <a:ext cx="700686" cy="5314"/>
+          </a:xfrm>
+          <a:prstGeom prst="straightConnector1">
+            <a:avLst/>
+          </a:prstGeom>
+          <a:ln>
+            <a:headEnd type="triangle" w="med" len="med"/>
+            <a:tailEnd type="triangle" w="med" len="med"/>
+          </a:ln>
+        </p:spPr>
+        <p:style>
+          <a:lnRef idx="3">
+            <a:schemeClr val="accent1"/>
+          </a:lnRef>
+          <a:fillRef idx="0">
+            <a:schemeClr val="accent1"/>
+          </a:fillRef>
+          <a:effectRef idx="2">
+            <a:schemeClr val="accent1"/>
+          </a:effectRef>
+          <a:fontRef idx="minor">
+            <a:schemeClr val="tx1"/>
+          </a:fontRef>
+        </p:style>
+      </p:cxnSp>
+      <p:sp>
+        <p:nvSpPr>
+          <p:cNvPr id="120" name="Rectangle 119">
+            <a:extLst>
+              <a:ext uri="{FF2B5EF4-FFF2-40B4-BE49-F238E27FC236}">
+                <a16:creationId xmlns:a16="http://schemas.microsoft.com/office/drawing/2014/main" id="{FB4A0D3F-D76B-7649-8553-766959E306B9}"/>
+              </a:ext>
+            </a:extLst>
+          </p:cNvPr>
+          <p:cNvSpPr/>
+          <p:nvPr/>
+        </p:nvSpPr>
+        <p:spPr>
+          <a:xfrm>
+            <a:off x="5579689" y="4047696"/>
+            <a:ext cx="720076" cy="360040"/>
+          </a:xfrm>
+          <a:prstGeom prst="rect">
+            <a:avLst/>
+          </a:prstGeom>
+        </p:spPr>
+        <p:style>
+          <a:lnRef idx="2">
+            <a:schemeClr val="accent1">
+              <a:shade val="50000"/>
+            </a:schemeClr>
+          </a:lnRef>
+          <a:fillRef idx="1">
+            <a:schemeClr val="accent1"/>
+          </a:fillRef>
+          <a:effectRef idx="0">
+            <a:schemeClr val="accent1"/>
+          </a:effectRef>
+          <a:fontRef idx="minor">
+            <a:schemeClr val="lt1"/>
+          </a:fontRef>
+        </p:style>
+        <p:txBody>
+          <a:bodyPr rot="0" spcFirstLastPara="0" vertOverflow="overflow" horzOverflow="overflow" vert="horz" wrap="square" lIns="91440" tIns="45720" rIns="91440" bIns="45720" numCol="1" spcCol="0" rtlCol="0" fromWordArt="0" anchor="ctr" anchorCtr="0" forceAA="0" compatLnSpc="1">
+            <a:prstTxWarp prst="textNoShape">
+              <a:avLst/>
+            </a:prstTxWarp>
+            <a:noAutofit/>
+          </a:bodyPr>
+          <a:lstStyle/>
+          <a:p>
+            <a:pPr algn="ctr"/>
+            <a:r>
+              <a:rPr lang="en-US" dirty="0"/>
+              <a:t>2</a:t>
+            </a:r>
+          </a:p>
+        </p:txBody>
+      </p:sp>
+      <p:cxnSp>
+        <p:nvCxnSpPr>
+          <p:cNvPr id="121" name="Straight Arrow Connector 120">
+            <a:extLst>
+              <a:ext uri="{FF2B5EF4-FFF2-40B4-BE49-F238E27FC236}">
+                <a16:creationId xmlns:a16="http://schemas.microsoft.com/office/drawing/2014/main" id="{703196F6-6AE4-534B-B5AF-532618168949}"/>
+              </a:ext>
+            </a:extLst>
+          </p:cNvPr>
+          <p:cNvCxnSpPr>
+            <a:cxnSpLocks/>
+            <a:stCxn id="16" idx="3"/>
+            <a:endCxn id="25" idx="1"/>
+          </p:cNvCxnSpPr>
+          <p:nvPr/>
+        </p:nvCxnSpPr>
+        <p:spPr>
+          <a:xfrm flipV="1">
+            <a:off x="3417989" y="4227716"/>
+            <a:ext cx="732393" cy="4232"/>
+          </a:xfrm>
+          <a:prstGeom prst="straightConnector1">
+            <a:avLst/>
+          </a:prstGeom>
+          <a:ln>
+            <a:tailEnd type="triangle"/>
+          </a:ln>
+        </p:spPr>
+        <p:style>
+          <a:lnRef idx="3">
+            <a:schemeClr val="accent1"/>
+          </a:lnRef>
+          <a:fillRef idx="0">
+            <a:schemeClr val="accent1"/>
+          </a:fillRef>
+          <a:effectRef idx="2">
+            <a:schemeClr val="accent1"/>
+          </a:effectRef>
+          <a:fontRef idx="minor">
+            <a:schemeClr val="tx1"/>
+          </a:fontRef>
+        </p:style>
+      </p:cxnSp>
+      <p:cxnSp>
+        <p:nvCxnSpPr>
+          <p:cNvPr id="122" name="Straight Arrow Connector 121">
+            <a:extLst>
+              <a:ext uri="{FF2B5EF4-FFF2-40B4-BE49-F238E27FC236}">
+                <a16:creationId xmlns:a16="http://schemas.microsoft.com/office/drawing/2014/main" id="{8DE7AD7D-4617-6C48-B4D0-A4554BCD2FAA}"/>
+              </a:ext>
+            </a:extLst>
+          </p:cNvPr>
+          <p:cNvCxnSpPr>
+            <a:cxnSpLocks/>
+            <a:endCxn id="120" idx="1"/>
+          </p:cNvCxnSpPr>
+          <p:nvPr/>
+        </p:nvCxnSpPr>
+        <p:spPr>
+          <a:xfrm>
+            <a:off x="4874234" y="4220435"/>
+            <a:ext cx="705455" cy="7281"/>
+          </a:xfrm>
+          <a:prstGeom prst="straightConnector1">
+            <a:avLst/>
+          </a:prstGeom>
+          <a:ln>
+            <a:tailEnd type="triangle"/>
+          </a:ln>
+        </p:spPr>
+        <p:style>
+          <a:lnRef idx="3">
+            <a:schemeClr val="accent1"/>
+          </a:lnRef>
+          <a:fillRef idx="0">
+            <a:schemeClr val="accent1"/>
+          </a:fillRef>
+          <a:effectRef idx="2">
+            <a:schemeClr val="accent1"/>
+          </a:effectRef>
+          <a:fontRef idx="minor">
+            <a:schemeClr val="tx1"/>
+          </a:fontRef>
+        </p:style>
+      </p:cxnSp>
+      <p:sp>
+        <p:nvSpPr>
+          <p:cNvPr id="124" name="Rectangle 123">
+            <a:extLst>
+              <a:ext uri="{FF2B5EF4-FFF2-40B4-BE49-F238E27FC236}">
+                <a16:creationId xmlns:a16="http://schemas.microsoft.com/office/drawing/2014/main" id="{97A8F441-6594-8C47-89B6-57DCBF9C2701}"/>
+              </a:ext>
+            </a:extLst>
+          </p:cNvPr>
+          <p:cNvSpPr/>
+          <p:nvPr/>
+        </p:nvSpPr>
+        <p:spPr>
+          <a:xfrm>
+            <a:off x="1039650" y="5672374"/>
+            <a:ext cx="5541117" cy="745380"/>
+          </a:xfrm>
+          <a:prstGeom prst="rect">
+            <a:avLst/>
+          </a:prstGeom>
+          <a:noFill/>
+          <a:ln>
+            <a:solidFill>
+              <a:schemeClr val="accent5"/>
+            </a:solidFill>
+            <a:prstDash val="sysDot"/>
+          </a:ln>
+          <a:effectLst/>
+        </p:spPr>
+        <p:style>
+          <a:lnRef idx="2">
+            <a:schemeClr val="accent1">
+              <a:shade val="50000"/>
+            </a:schemeClr>
+          </a:lnRef>
+          <a:fillRef idx="1">
+            <a:schemeClr val="accent1"/>
+          </a:fillRef>
+          <a:effectRef idx="0">
+            <a:schemeClr val="accent1"/>
+          </a:effectRef>
+          <a:fontRef idx="minor">
+            <a:schemeClr val="lt1"/>
+          </a:fontRef>
+        </p:style>
+        <p:txBody>
+          <a:bodyPr rtlCol="0" anchor="ctr"/>
+          <a:lstStyle/>
+          <a:p>
+            <a:pPr algn="ctr"/>
+            <a:endParaRPr lang="en-US"/>
+          </a:p>
+        </p:txBody>
+      </p:sp>
+      <p:sp>
+        <p:nvSpPr>
+          <p:cNvPr id="125" name="Rectangle 124">
+            <a:extLst>
+              <a:ext uri="{FF2B5EF4-FFF2-40B4-BE49-F238E27FC236}">
+                <a16:creationId xmlns:a16="http://schemas.microsoft.com/office/drawing/2014/main" id="{E5E46693-D41C-4845-8C24-9C1234DE417C}"/>
+              </a:ext>
+            </a:extLst>
+          </p:cNvPr>
+          <p:cNvSpPr/>
+          <p:nvPr/>
+        </p:nvSpPr>
+        <p:spPr>
+          <a:xfrm>
+            <a:off x="2693794" y="5868177"/>
+            <a:ext cx="720076" cy="360040"/>
+          </a:xfrm>
+          <a:prstGeom prst="rect">
+            <a:avLst/>
+          </a:prstGeom>
+        </p:spPr>
+        <p:style>
+          <a:lnRef idx="2">
+            <a:schemeClr val="accent1">
+              <a:shade val="50000"/>
+            </a:schemeClr>
+          </a:lnRef>
+          <a:fillRef idx="1">
+            <a:schemeClr val="accent1"/>
+          </a:fillRef>
+          <a:effectRef idx="0">
+            <a:schemeClr val="accent1"/>
+          </a:effectRef>
+          <a:fontRef idx="minor">
+            <a:schemeClr val="lt1"/>
+          </a:fontRef>
+        </p:style>
+        <p:txBody>
+          <a:bodyPr rot="0" spcFirstLastPara="0" vertOverflow="overflow" horzOverflow="overflow" vert="horz" wrap="square" lIns="91440" tIns="45720" rIns="91440" bIns="45720" numCol="1" spcCol="0" rtlCol="0" fromWordArt="0" anchor="ctr" anchorCtr="0" forceAA="0" compatLnSpc="1">
+            <a:prstTxWarp prst="textNoShape">
+              <a:avLst/>
+            </a:prstTxWarp>
+            <a:noAutofit/>
+          </a:bodyPr>
+          <a:lstStyle/>
+          <a:p>
+            <a:pPr algn="ctr"/>
+            <a:r>
+              <a:rPr lang="en-US" dirty="0"/>
+              <a:t>3</a:t>
+            </a:r>
+          </a:p>
+        </p:txBody>
+      </p:sp>
+      <p:sp>
+        <p:nvSpPr>
+          <p:cNvPr id="126" name="Rectangle 125">
+            <a:extLst>
+              <a:ext uri="{FF2B5EF4-FFF2-40B4-BE49-F238E27FC236}">
+                <a16:creationId xmlns:a16="http://schemas.microsoft.com/office/drawing/2014/main" id="{6464203A-A234-3748-84C3-FECAF6281441}"/>
+              </a:ext>
+            </a:extLst>
+          </p:cNvPr>
+          <p:cNvSpPr/>
+          <p:nvPr/>
+        </p:nvSpPr>
+        <p:spPr>
+          <a:xfrm>
+            <a:off x="1267005" y="4785436"/>
+            <a:ext cx="727806" cy="716033"/>
+          </a:xfrm>
+          <a:prstGeom prst="rect">
+            <a:avLst/>
+          </a:prstGeom>
+          <a:solidFill>
+            <a:schemeClr val="accent2"/>
+          </a:solidFill>
+        </p:spPr>
+        <p:style>
+          <a:lnRef idx="2">
+            <a:schemeClr val="accent1">
+              <a:shade val="50000"/>
+            </a:schemeClr>
+          </a:lnRef>
+          <a:fillRef idx="1">
+            <a:schemeClr val="accent1"/>
+          </a:fillRef>
+          <a:effectRef idx="0">
+            <a:schemeClr val="accent1"/>
+          </a:effectRef>
+          <a:fontRef idx="minor">
+            <a:schemeClr val="lt1"/>
+          </a:fontRef>
+        </p:style>
+        <p:txBody>
+          <a:bodyPr rot="0" spcFirstLastPara="0" vertOverflow="overflow" horzOverflow="overflow" vert="horz" wrap="square" lIns="91440" tIns="45720" rIns="91440" bIns="45720" numCol="1" spcCol="0" rtlCol="0" fromWordArt="0" anchor="ctr" anchorCtr="0" forceAA="0" compatLnSpc="1">
+            <a:prstTxWarp prst="textNoShape">
+              <a:avLst/>
+            </a:prstTxWarp>
+            <a:noAutofit/>
+          </a:bodyPr>
+          <a:lstStyle/>
+          <a:p>
+            <a:pPr algn="ctr"/>
+            <a:r>
+              <a:rPr lang="en-US" sz="1100" dirty="0"/>
+              <a:t>Develop</a:t>
+            </a:r>
+          </a:p>
+        </p:txBody>
+      </p:sp>
+      <p:sp>
+        <p:nvSpPr>
+          <p:cNvPr id="128" name="Rectangle 127">
+            <a:extLst>
+              <a:ext uri="{FF2B5EF4-FFF2-40B4-BE49-F238E27FC236}">
+                <a16:creationId xmlns:a16="http://schemas.microsoft.com/office/drawing/2014/main" id="{004DF5E1-7B24-F04B-B1FC-85A255BE4966}"/>
+              </a:ext>
+            </a:extLst>
+          </p:cNvPr>
+          <p:cNvSpPr/>
+          <p:nvPr/>
+        </p:nvSpPr>
+        <p:spPr>
+          <a:xfrm>
+            <a:off x="2695497" y="4790047"/>
+            <a:ext cx="720076" cy="717440"/>
+          </a:xfrm>
+          <a:prstGeom prst="rect">
+            <a:avLst/>
+          </a:prstGeom>
+          <a:pattFill prst="dkHorz">
+            <a:fgClr>
+              <a:schemeClr val="accent1"/>
+            </a:fgClr>
+            <a:bgClr>
+              <a:schemeClr val="bg1"/>
+            </a:bgClr>
+          </a:pattFill>
+        </p:spPr>
+        <p:style>
+          <a:lnRef idx="2">
+            <a:schemeClr val="accent1">
+              <a:shade val="50000"/>
+            </a:schemeClr>
+          </a:lnRef>
+          <a:fillRef idx="1">
+            <a:schemeClr val="accent1"/>
+          </a:fillRef>
+          <a:effectRef idx="0">
+            <a:schemeClr val="accent1"/>
+          </a:effectRef>
+          <a:fontRef idx="minor">
+            <a:schemeClr val="lt1"/>
+          </a:fontRef>
+        </p:style>
+        <p:txBody>
+          <a:bodyPr rot="0" spcFirstLastPara="0" vertOverflow="overflow" horzOverflow="overflow" vert="horz" wrap="square" lIns="91440" tIns="45720" rIns="91440" bIns="45720" numCol="1" spcCol="0" rtlCol="0" fromWordArt="0" anchor="ctr" anchorCtr="0" forceAA="0" compatLnSpc="1">
+            <a:prstTxWarp prst="textNoShape">
+              <a:avLst/>
+            </a:prstTxWarp>
+            <a:noAutofit/>
+          </a:bodyPr>
+          <a:lstStyle/>
+          <a:p>
+            <a:pPr algn="ctr"/>
+            <a:endParaRPr lang="en-US" dirty="0"/>
+          </a:p>
+        </p:txBody>
+      </p:sp>
+      <p:sp>
+        <p:nvSpPr>
+          <p:cNvPr id="129" name="Rectangle 128">
+            <a:extLst>
+              <a:ext uri="{FF2B5EF4-FFF2-40B4-BE49-F238E27FC236}">
+                <a16:creationId xmlns:a16="http://schemas.microsoft.com/office/drawing/2014/main" id="{AAAE87F5-2803-334B-8584-3E0F16C8609A}"/>
+              </a:ext>
+            </a:extLst>
+          </p:cNvPr>
+          <p:cNvSpPr/>
+          <p:nvPr/>
+        </p:nvSpPr>
+        <p:spPr>
+          <a:xfrm>
+            <a:off x="4146263" y="5863945"/>
+            <a:ext cx="720076" cy="360040"/>
+          </a:xfrm>
+          <a:prstGeom prst="rect">
+            <a:avLst/>
+          </a:prstGeom>
+        </p:spPr>
+        <p:style>
+          <a:lnRef idx="2">
+            <a:schemeClr val="accent1">
+              <a:shade val="50000"/>
+            </a:schemeClr>
+          </a:lnRef>
+          <a:fillRef idx="1">
+            <a:schemeClr val="accent1"/>
+          </a:fillRef>
+          <a:effectRef idx="0">
+            <a:schemeClr val="accent1"/>
+          </a:effectRef>
+          <a:fontRef idx="minor">
+            <a:schemeClr val="lt1"/>
+          </a:fontRef>
+        </p:style>
+        <p:txBody>
+          <a:bodyPr rot="0" spcFirstLastPara="0" vertOverflow="overflow" horzOverflow="overflow" vert="horz" wrap="square" lIns="91440" tIns="45720" rIns="91440" bIns="45720" numCol="1" spcCol="0" rtlCol="0" fromWordArt="0" anchor="ctr" anchorCtr="0" forceAA="0" compatLnSpc="1">
+            <a:prstTxWarp prst="textNoShape">
+              <a:avLst/>
+            </a:prstTxWarp>
+            <a:noAutofit/>
+          </a:bodyPr>
+          <a:lstStyle/>
+          <a:p>
+            <a:pPr algn="ctr"/>
+            <a:r>
+              <a:rPr lang="en-US" dirty="0"/>
+              <a:t>3</a:t>
+            </a:r>
+          </a:p>
+        </p:txBody>
+      </p:sp>
+      <p:cxnSp>
+        <p:nvCxnSpPr>
+          <p:cNvPr id="130" name="Straight Arrow Connector 129">
+            <a:extLst>
+              <a:ext uri="{FF2B5EF4-FFF2-40B4-BE49-F238E27FC236}">
+                <a16:creationId xmlns:a16="http://schemas.microsoft.com/office/drawing/2014/main" id="{BF67C41C-F8F8-434D-A3A0-DA09C7AE7D1F}"/>
+              </a:ext>
+            </a:extLst>
+          </p:cNvPr>
+          <p:cNvCxnSpPr>
+            <a:cxnSpLocks/>
+          </p:cNvCxnSpPr>
+          <p:nvPr/>
+        </p:nvCxnSpPr>
+        <p:spPr>
+          <a:xfrm>
+            <a:off x="3053832" y="5508705"/>
+            <a:ext cx="0" cy="360036"/>
+          </a:xfrm>
+          <a:prstGeom prst="straightConnector1">
+            <a:avLst/>
+          </a:prstGeom>
+          <a:ln>
+            <a:tailEnd type="triangle"/>
+          </a:ln>
+        </p:spPr>
+        <p:style>
+          <a:lnRef idx="3">
+            <a:schemeClr val="accent1"/>
+          </a:lnRef>
+          <a:fillRef idx="0">
+            <a:schemeClr val="accent1"/>
+          </a:fillRef>
+          <a:effectRef idx="2">
+            <a:schemeClr val="accent1"/>
+          </a:effectRef>
+          <a:fontRef idx="minor">
+            <a:schemeClr val="tx1"/>
+          </a:fontRef>
+        </p:style>
+      </p:cxnSp>
+      <p:sp>
+        <p:nvSpPr>
+          <p:cNvPr id="131" name="TextBox 130">
+            <a:extLst>
+              <a:ext uri="{FF2B5EF4-FFF2-40B4-BE49-F238E27FC236}">
+                <a16:creationId xmlns:a16="http://schemas.microsoft.com/office/drawing/2014/main" id="{54F878D3-4980-2D4C-8869-BDA06989D965}"/>
+              </a:ext>
+            </a:extLst>
+          </p:cNvPr>
+          <p:cNvSpPr txBox="1"/>
+          <p:nvPr/>
+        </p:nvSpPr>
+        <p:spPr>
+          <a:xfrm>
+            <a:off x="1277971" y="5907273"/>
+            <a:ext cx="720066" cy="276999"/>
+          </a:xfrm>
+          <a:prstGeom prst="rect">
+            <a:avLst/>
+          </a:prstGeom>
+          <a:noFill/>
+        </p:spPr>
+        <p:txBody>
+          <a:bodyPr wrap="square" rtlCol="0">
+            <a:spAutoFit/>
+          </a:bodyPr>
+          <a:lstStyle/>
+          <a:p>
+            <a:pPr algn="ctr"/>
+            <a:r>
+              <a:rPr lang="en-US" sz="1200" dirty="0">
+                <a:solidFill>
+                  <a:schemeClr val="accent1"/>
+                </a:solidFill>
+              </a:rPr>
+              <a:t>Commit</a:t>
+            </a:r>
+          </a:p>
+        </p:txBody>
+      </p:sp>
+      <p:cxnSp>
+        <p:nvCxnSpPr>
+          <p:cNvPr id="137" name="Straight Arrow Connector 136">
+            <a:extLst>
+              <a:ext uri="{FF2B5EF4-FFF2-40B4-BE49-F238E27FC236}">
+                <a16:creationId xmlns:a16="http://schemas.microsoft.com/office/drawing/2014/main" id="{89EB3D92-0437-9C45-912F-6E1D778BDA9E}"/>
+              </a:ext>
+            </a:extLst>
+          </p:cNvPr>
+          <p:cNvCxnSpPr>
+            <a:cxnSpLocks/>
+            <a:stCxn id="126" idx="3"/>
+            <a:endCxn id="128" idx="1"/>
+          </p:cNvCxnSpPr>
+          <p:nvPr/>
+        </p:nvCxnSpPr>
+        <p:spPr>
+          <a:xfrm>
+            <a:off x="1994811" y="5143453"/>
+            <a:ext cx="700686" cy="5314"/>
+          </a:xfrm>
+          <a:prstGeom prst="straightConnector1">
+            <a:avLst/>
+          </a:prstGeom>
+          <a:ln>
+            <a:headEnd type="triangle" w="med" len="med"/>
+            <a:tailEnd type="triangle" w="med" len="med"/>
+          </a:ln>
+        </p:spPr>
+        <p:style>
+          <a:lnRef idx="3">
+            <a:schemeClr val="accent1"/>
+          </a:lnRef>
+          <a:fillRef idx="0">
+            <a:schemeClr val="accent1"/>
+          </a:fillRef>
+          <a:effectRef idx="2">
+            <a:schemeClr val="accent1"/>
+          </a:effectRef>
+          <a:fontRef idx="minor">
+            <a:schemeClr val="tx1"/>
+          </a:fontRef>
+        </p:style>
+      </p:cxnSp>
+      <p:cxnSp>
+        <p:nvCxnSpPr>
+          <p:cNvPr id="139" name="Straight Arrow Connector 138">
+            <a:extLst>
+              <a:ext uri="{FF2B5EF4-FFF2-40B4-BE49-F238E27FC236}">
+                <a16:creationId xmlns:a16="http://schemas.microsoft.com/office/drawing/2014/main" id="{1A3F7358-CBCF-3240-A3A4-FB86A30115B7}"/>
+              </a:ext>
+            </a:extLst>
+          </p:cNvPr>
+          <p:cNvCxnSpPr>
+            <a:cxnSpLocks/>
+            <a:stCxn id="125" idx="3"/>
+            <a:endCxn id="129" idx="1"/>
+          </p:cNvCxnSpPr>
+          <p:nvPr/>
+        </p:nvCxnSpPr>
+        <p:spPr>
+          <a:xfrm flipV="1">
+            <a:off x="3413870" y="6043965"/>
+            <a:ext cx="732393" cy="4232"/>
+          </a:xfrm>
+          <a:prstGeom prst="straightConnector1">
+            <a:avLst/>
+          </a:prstGeom>
+          <a:ln>
+            <a:tailEnd type="triangle"/>
+          </a:ln>
+        </p:spPr>
+        <p:style>
+          <a:lnRef idx="3">
+            <a:schemeClr val="accent1"/>
+          </a:lnRef>
+          <a:fillRef idx="0">
+            <a:schemeClr val="accent1"/>
+          </a:fillRef>
+          <a:effectRef idx="2">
+            <a:schemeClr val="accent1"/>
+          </a:effectRef>
+          <a:fontRef idx="minor">
+            <a:schemeClr val="tx1"/>
+          </a:fontRef>
+        </p:style>
+      </p:cxnSp>
+      <p:cxnSp>
+        <p:nvCxnSpPr>
+          <p:cNvPr id="141" name="Straight Arrow Connector 140">
+            <a:extLst>
+              <a:ext uri="{FF2B5EF4-FFF2-40B4-BE49-F238E27FC236}">
+                <a16:creationId xmlns:a16="http://schemas.microsoft.com/office/drawing/2014/main" id="{90098299-7374-724D-A2B4-18694362D8E7}"/>
+              </a:ext>
+            </a:extLst>
+          </p:cNvPr>
+          <p:cNvCxnSpPr>
+            <a:cxnSpLocks/>
+            <a:stCxn id="16" idx="2"/>
+          </p:cNvCxnSpPr>
+          <p:nvPr/>
+        </p:nvCxnSpPr>
+        <p:spPr>
+          <a:xfrm>
+            <a:off x="3057951" y="4411968"/>
+            <a:ext cx="1818" cy="373468"/>
+          </a:xfrm>
+          <a:prstGeom prst="straightConnector1">
+            <a:avLst/>
+          </a:prstGeom>
+          <a:ln>
+            <a:tailEnd type="triangle"/>
+          </a:ln>
+        </p:spPr>
+        <p:style>
+          <a:lnRef idx="3">
+            <a:schemeClr val="accent1"/>
+          </a:lnRef>
+          <a:fillRef idx="0">
+            <a:schemeClr val="accent1"/>
+          </a:fillRef>
+          <a:effectRef idx="2">
+            <a:schemeClr val="accent1"/>
+          </a:effectRef>
+          <a:fontRef idx="minor">
+            <a:schemeClr val="tx1"/>
+          </a:fontRef>
+        </p:style>
+      </p:cxnSp>
+      <p:sp>
+        <p:nvSpPr>
+          <p:cNvPr id="142" name="Rectangle 141">
+            <a:extLst>
+              <a:ext uri="{FF2B5EF4-FFF2-40B4-BE49-F238E27FC236}">
+                <a16:creationId xmlns:a16="http://schemas.microsoft.com/office/drawing/2014/main" id="{2B82B091-E824-AC43-88DB-AFE2AF1F1106}"/>
+              </a:ext>
+            </a:extLst>
+          </p:cNvPr>
+          <p:cNvSpPr/>
+          <p:nvPr/>
+        </p:nvSpPr>
+        <p:spPr>
+          <a:xfrm>
+            <a:off x="5583656" y="5863945"/>
+            <a:ext cx="720076" cy="360040"/>
+          </a:xfrm>
+          <a:prstGeom prst="rect">
+            <a:avLst/>
+          </a:prstGeom>
+        </p:spPr>
+        <p:style>
+          <a:lnRef idx="2">
+            <a:schemeClr val="accent1">
+              <a:shade val="50000"/>
+            </a:schemeClr>
+          </a:lnRef>
+          <a:fillRef idx="1">
+            <a:schemeClr val="accent1"/>
+          </a:fillRef>
+          <a:effectRef idx="0">
+            <a:schemeClr val="accent1"/>
+          </a:effectRef>
+          <a:fontRef idx="minor">
+            <a:schemeClr val="lt1"/>
+          </a:fontRef>
+        </p:style>
+        <p:txBody>
+          <a:bodyPr rot="0" spcFirstLastPara="0" vertOverflow="overflow" horzOverflow="overflow" vert="horz" wrap="square" lIns="91440" tIns="45720" rIns="91440" bIns="45720" numCol="1" spcCol="0" rtlCol="0" fromWordArt="0" anchor="ctr" anchorCtr="0" forceAA="0" compatLnSpc="1">
+            <a:prstTxWarp prst="textNoShape">
+              <a:avLst/>
+            </a:prstTxWarp>
+            <a:noAutofit/>
+          </a:bodyPr>
+          <a:lstStyle/>
+          <a:p>
+            <a:pPr algn="ctr"/>
+            <a:r>
+              <a:rPr lang="en-US" dirty="0"/>
+              <a:t>2</a:t>
+            </a:r>
+          </a:p>
+        </p:txBody>
+      </p:sp>
+      <p:sp>
+        <p:nvSpPr>
+          <p:cNvPr id="149" name="Rectangle 148">
+            <a:extLst>
+              <a:ext uri="{FF2B5EF4-FFF2-40B4-BE49-F238E27FC236}">
+                <a16:creationId xmlns:a16="http://schemas.microsoft.com/office/drawing/2014/main" id="{8E222986-B96A-4843-86DD-50248A51B0E8}"/>
+              </a:ext>
+            </a:extLst>
+          </p:cNvPr>
+          <p:cNvSpPr/>
+          <p:nvPr/>
+        </p:nvSpPr>
+        <p:spPr>
+          <a:xfrm>
+            <a:off x="1039650" y="6619680"/>
+            <a:ext cx="5541117" cy="745380"/>
+          </a:xfrm>
+          <a:prstGeom prst="rect">
+            <a:avLst/>
+          </a:prstGeom>
+          <a:noFill/>
+          <a:ln>
+            <a:solidFill>
+              <a:schemeClr val="accent5"/>
+            </a:solidFill>
+            <a:prstDash val="sysDot"/>
+          </a:ln>
+          <a:effectLst/>
+        </p:spPr>
+        <p:style>
+          <a:lnRef idx="2">
+            <a:schemeClr val="accent1">
+              <a:shade val="50000"/>
+            </a:schemeClr>
+          </a:lnRef>
+          <a:fillRef idx="1">
+            <a:schemeClr val="accent1"/>
+          </a:fillRef>
+          <a:effectRef idx="0">
+            <a:schemeClr val="accent1"/>
+          </a:effectRef>
+          <a:fontRef idx="minor">
+            <a:schemeClr val="lt1"/>
+          </a:fontRef>
+        </p:style>
+        <p:txBody>
+          <a:bodyPr rtlCol="0" anchor="ctr"/>
+          <a:lstStyle/>
+          <a:p>
+            <a:pPr algn="ctr"/>
+            <a:endParaRPr lang="en-US"/>
+          </a:p>
+        </p:txBody>
+      </p:sp>
+      <p:sp>
+        <p:nvSpPr>
+          <p:cNvPr id="151" name="Rectangle 150">
+            <a:extLst>
+              <a:ext uri="{FF2B5EF4-FFF2-40B4-BE49-F238E27FC236}">
+                <a16:creationId xmlns:a16="http://schemas.microsoft.com/office/drawing/2014/main" id="{02937745-4F87-4140-B926-AC4408A09695}"/>
+              </a:ext>
+            </a:extLst>
+          </p:cNvPr>
+          <p:cNvSpPr/>
+          <p:nvPr/>
+        </p:nvSpPr>
+        <p:spPr>
+          <a:xfrm>
+            <a:off x="4146263" y="6811251"/>
+            <a:ext cx="720076" cy="360040"/>
+          </a:xfrm>
+          <a:prstGeom prst="rect">
+            <a:avLst/>
+          </a:prstGeom>
+        </p:spPr>
+        <p:style>
+          <a:lnRef idx="2">
+            <a:schemeClr val="accent1">
+              <a:shade val="50000"/>
+            </a:schemeClr>
+          </a:lnRef>
+          <a:fillRef idx="1">
+            <a:schemeClr val="accent1"/>
+          </a:fillRef>
+          <a:effectRef idx="0">
+            <a:schemeClr val="accent1"/>
+          </a:effectRef>
+          <a:fontRef idx="minor">
+            <a:schemeClr val="lt1"/>
+          </a:fontRef>
+        </p:style>
+        <p:txBody>
+          <a:bodyPr rot="0" spcFirstLastPara="0" vertOverflow="overflow" horzOverflow="overflow" vert="horz" wrap="square" lIns="91440" tIns="45720" rIns="91440" bIns="45720" numCol="1" spcCol="0" rtlCol="0" fromWordArt="0" anchor="ctr" anchorCtr="0" forceAA="0" compatLnSpc="1">
+            <a:prstTxWarp prst="textNoShape">
+              <a:avLst/>
+            </a:prstTxWarp>
+            <a:noAutofit/>
+          </a:bodyPr>
+          <a:lstStyle/>
+          <a:p>
+            <a:pPr algn="ctr"/>
+            <a:r>
+              <a:rPr lang="en-US" dirty="0"/>
+              <a:t>3</a:t>
+            </a:r>
+          </a:p>
+        </p:txBody>
+      </p:sp>
+      <p:sp>
+        <p:nvSpPr>
+          <p:cNvPr id="152" name="TextBox 151">
+            <a:extLst>
+              <a:ext uri="{FF2B5EF4-FFF2-40B4-BE49-F238E27FC236}">
+                <a16:creationId xmlns:a16="http://schemas.microsoft.com/office/drawing/2014/main" id="{644D3550-1F01-D146-A482-4098E6CF6FDE}"/>
+              </a:ext>
+            </a:extLst>
+          </p:cNvPr>
+          <p:cNvSpPr txBox="1"/>
+          <p:nvPr/>
+        </p:nvSpPr>
+        <p:spPr>
+          <a:xfrm>
+            <a:off x="1277971" y="6854579"/>
+            <a:ext cx="720066" cy="276999"/>
+          </a:xfrm>
+          <a:prstGeom prst="rect">
+            <a:avLst/>
+          </a:prstGeom>
+          <a:noFill/>
+        </p:spPr>
+        <p:txBody>
+          <a:bodyPr wrap="square" rtlCol="0">
+            <a:spAutoFit/>
+          </a:bodyPr>
+          <a:lstStyle/>
+          <a:p>
+            <a:pPr algn="ctr"/>
+            <a:r>
+              <a:rPr lang="en-US" sz="1200" dirty="0">
+                <a:solidFill>
+                  <a:schemeClr val="accent1"/>
+                </a:solidFill>
+              </a:rPr>
+              <a:t>Push</a:t>
+            </a:r>
+          </a:p>
+        </p:txBody>
+      </p:sp>
+      <p:sp>
+        <p:nvSpPr>
+          <p:cNvPr id="155" name="Rectangle 154">
+            <a:extLst>
+              <a:ext uri="{FF2B5EF4-FFF2-40B4-BE49-F238E27FC236}">
+                <a16:creationId xmlns:a16="http://schemas.microsoft.com/office/drawing/2014/main" id="{D4175E02-35C3-6648-8F78-50F09D38FDA1}"/>
+              </a:ext>
+            </a:extLst>
+          </p:cNvPr>
+          <p:cNvSpPr/>
+          <p:nvPr/>
+        </p:nvSpPr>
+        <p:spPr>
+          <a:xfrm>
+            <a:off x="5583656" y="6811251"/>
+            <a:ext cx="720076" cy="360040"/>
+          </a:xfrm>
+          <a:prstGeom prst="rect">
+            <a:avLst/>
+          </a:prstGeom>
+        </p:spPr>
+        <p:style>
+          <a:lnRef idx="2">
+            <a:schemeClr val="accent1">
+              <a:shade val="50000"/>
+            </a:schemeClr>
+          </a:lnRef>
+          <a:fillRef idx="1">
+            <a:schemeClr val="accent1"/>
+          </a:fillRef>
+          <a:effectRef idx="0">
+            <a:schemeClr val="accent1"/>
+          </a:effectRef>
+          <a:fontRef idx="minor">
+            <a:schemeClr val="lt1"/>
+          </a:fontRef>
+        </p:style>
+        <p:txBody>
+          <a:bodyPr rot="0" spcFirstLastPara="0" vertOverflow="overflow" horzOverflow="overflow" vert="horz" wrap="square" lIns="91440" tIns="45720" rIns="91440" bIns="45720" numCol="1" spcCol="0" rtlCol="0" fromWordArt="0" anchor="ctr" anchorCtr="0" forceAA="0" compatLnSpc="1">
+            <a:prstTxWarp prst="textNoShape">
+              <a:avLst/>
+            </a:prstTxWarp>
+            <a:noAutofit/>
+          </a:bodyPr>
+          <a:lstStyle/>
+          <a:p>
+            <a:pPr algn="ctr"/>
+            <a:r>
+              <a:rPr lang="en-US" dirty="0"/>
+              <a:t>3</a:t>
+            </a:r>
+          </a:p>
+        </p:txBody>
+      </p:sp>
+      <p:cxnSp>
+        <p:nvCxnSpPr>
+          <p:cNvPr id="156" name="Straight Arrow Connector 155">
+            <a:extLst>
+              <a:ext uri="{FF2B5EF4-FFF2-40B4-BE49-F238E27FC236}">
+                <a16:creationId xmlns:a16="http://schemas.microsoft.com/office/drawing/2014/main" id="{2ECB4DED-27EF-9C4B-859F-9193E184A0D8}"/>
+              </a:ext>
+            </a:extLst>
+          </p:cNvPr>
+          <p:cNvCxnSpPr>
+            <a:cxnSpLocks/>
+            <a:stCxn id="129" idx="2"/>
+            <a:endCxn id="151" idx="0"/>
+          </p:cNvCxnSpPr>
+          <p:nvPr/>
+        </p:nvCxnSpPr>
+        <p:spPr>
+          <a:xfrm>
+            <a:off x="4506301" y="6223985"/>
+            <a:ext cx="0" cy="587266"/>
+          </a:xfrm>
+          <a:prstGeom prst="straightConnector1">
+            <a:avLst/>
+          </a:prstGeom>
+          <a:ln>
+            <a:tailEnd type="triangle"/>
+          </a:ln>
+        </p:spPr>
+        <p:style>
+          <a:lnRef idx="3">
+            <a:schemeClr val="accent1"/>
+          </a:lnRef>
+          <a:fillRef idx="0">
+            <a:schemeClr val="accent1"/>
+          </a:fillRef>
+          <a:effectRef idx="2">
+            <a:schemeClr val="accent1"/>
+          </a:effectRef>
+          <a:fontRef idx="minor">
+            <a:schemeClr val="tx1"/>
+          </a:fontRef>
+        </p:style>
+      </p:cxnSp>
+      <p:cxnSp>
+        <p:nvCxnSpPr>
+          <p:cNvPr id="157" name="Straight Arrow Connector 156">
+            <a:extLst>
+              <a:ext uri="{FF2B5EF4-FFF2-40B4-BE49-F238E27FC236}">
+                <a16:creationId xmlns:a16="http://schemas.microsoft.com/office/drawing/2014/main" id="{60E8B176-73FD-0746-BC14-B4DAF99375C0}"/>
+              </a:ext>
+            </a:extLst>
+          </p:cNvPr>
+          <p:cNvCxnSpPr>
+            <a:cxnSpLocks/>
+            <a:stCxn id="151" idx="3"/>
+            <a:endCxn id="155" idx="1"/>
+          </p:cNvCxnSpPr>
+          <p:nvPr/>
+        </p:nvCxnSpPr>
+        <p:spPr>
+          <a:xfrm>
+            <a:off x="4866339" y="6991271"/>
+            <a:ext cx="717317" cy="0"/>
+          </a:xfrm>
+          <a:prstGeom prst="straightConnector1">
+            <a:avLst/>
+          </a:prstGeom>
+          <a:ln>
+            <a:tailEnd type="triangle"/>
+          </a:ln>
+        </p:spPr>
+        <p:style>
+          <a:lnRef idx="3">
+            <a:schemeClr val="accent1"/>
+          </a:lnRef>
+          <a:fillRef idx="0">
+            <a:schemeClr val="accent1"/>
+          </a:fillRef>
+          <a:effectRef idx="2">
+            <a:schemeClr val="accent1"/>
+          </a:effectRef>
+          <a:fontRef idx="minor">
+            <a:schemeClr val="tx1"/>
+          </a:fontRef>
+        </p:style>
+      </p:cxnSp>
+    </p:spTree>
+    <p:extLst>
+      <p:ext uri="{BB962C8B-B14F-4D97-AF65-F5344CB8AC3E}">
+        <p14:creationId xmlns:p14="http://schemas.microsoft.com/office/powerpoint/2010/main" val="1376897211"/>
+      </p:ext>
+    </p:extLst>
+  </p:cSld>
+  <p:clrMapOvr>
+    <a:masterClrMapping/>
+  </p:clrMapOvr>
+</p:sld>
+</file>
+
 <file path=ppt/theme/theme1.xml><?xml version="1.0" encoding="utf-8"?>
 <a:theme xmlns:a="http://schemas.openxmlformats.org/drawingml/2006/main" name="Mendix2018 Theme">
   <a:themeElements>
@@ -11988,6 +14067,21 @@
 </file>
 
 <file path=customXml/item1.xml><?xml version="1.0" encoding="utf-8"?>
+<p:properties xmlns:p="http://schemas.microsoft.com/office/2006/metadata/properties" xmlns:xsi="http://www.w3.org/2001/XMLSchema-instance" xmlns:pc="http://schemas.microsoft.com/office/infopath/2007/PartnerControls">
+  <documentManagement/>
+</p:properties>
+</file>
+
+<file path=customXml/item2.xml><?xml version="1.0" encoding="utf-8"?>
+<?mso-contentType ?>
+<FormTemplates xmlns="http://schemas.microsoft.com/sharepoint/v3/contenttype/forms">
+  <Display>DocumentLibraryForm</Display>
+  <Edit>DocumentLibraryForm</Edit>
+  <New>DocumentLibraryForm</New>
+</FormTemplates>
+</file>
+
+<file path=customXml/item3.xml><?xml version="1.0" encoding="utf-8"?>
 <ct:contentTypeSchema xmlns:ct="http://schemas.microsoft.com/office/2006/metadata/contentType" xmlns:ma="http://schemas.microsoft.com/office/2006/metadata/properties/metaAttributes" ct:_="" ma:_="" ma:contentTypeName="Document" ma:contentTypeID="0x010100CB10EEC9AA2FB7408E4323A6A779B041" ma:contentTypeVersion="12" ma:contentTypeDescription="Create a new document." ma:contentTypeScope="" ma:versionID="0ccd36f27b3fab66da7d3daa9156da05">
   <xsd:schema xmlns:xsd="http://www.w3.org/2001/XMLSchema" xmlns:xs="http://www.w3.org/2001/XMLSchema" xmlns:p="http://schemas.microsoft.com/office/2006/metadata/properties" xmlns:ns3="416c5dfc-1efd-4b21-a4bc-b8850f7bb253" xmlns:ns4="3d1d779b-3ed4-468b-9ba2-fdda46887e73" targetNamespace="http://schemas.microsoft.com/office/2006/metadata/properties" ma:root="true" ma:fieldsID="c26b511b8e7b72d7d12d1f12c5f09521" ns3:_="" ns4:_="">
     <xsd:import namespace="416c5dfc-1efd-4b21-a4bc-b8850f7bb253"/>
@@ -12204,22 +14298,32 @@
 </ct:contentTypeSchema>
 </file>
 
-<file path=customXml/item2.xml><?xml version="1.0" encoding="utf-8"?>
-<?mso-contentType ?>
-<FormTemplates xmlns="http://schemas.microsoft.com/sharepoint/v3/contenttype/forms">
-  <Display>DocumentLibraryForm</Display>
-  <Edit>DocumentLibraryForm</Edit>
-  <New>DocumentLibraryForm</New>
-</FormTemplates>
+<file path=customXml/itemProps1.xml><?xml version="1.0" encoding="utf-8"?>
+<ds:datastoreItem xmlns:ds="http://schemas.openxmlformats.org/officeDocument/2006/customXml" ds:itemID="{03151227-4A3A-4E37-8E20-819026BD1323}">
+  <ds:schemaRefs>
+    <ds:schemaRef ds:uri="http://schemas.openxmlformats.org/package/2006/metadata/core-properties"/>
+    <ds:schemaRef ds:uri="http://purl.org/dc/terms/"/>
+    <ds:schemaRef ds:uri="http://schemas.microsoft.com/office/2006/metadata/properties"/>
+    <ds:schemaRef ds:uri="http://purl.org/dc/dcmitype/"/>
+    <ds:schemaRef ds:uri="416c5dfc-1efd-4b21-a4bc-b8850f7bb253"/>
+    <ds:schemaRef ds:uri="http://schemas.microsoft.com/office/2006/documentManagement/types"/>
+    <ds:schemaRef ds:uri="http://schemas.microsoft.com/office/infopath/2007/PartnerControls"/>
+    <ds:schemaRef ds:uri="3d1d779b-3ed4-468b-9ba2-fdda46887e73"/>
+    <ds:schemaRef ds:uri="http://www.w3.org/XML/1998/namespace"/>
+    <ds:schemaRef ds:uri="http://purl.org/dc/elements/1.1/"/>
+  </ds:schemaRefs>
+</ds:datastoreItem>
 </file>
 
-<file path=customXml/item3.xml><?xml version="1.0" encoding="utf-8"?>
-<p:properties xmlns:p="http://schemas.microsoft.com/office/2006/metadata/properties" xmlns:xsi="http://www.w3.org/2001/XMLSchema-instance" xmlns:pc="http://schemas.microsoft.com/office/infopath/2007/PartnerControls">
-  <documentManagement/>
-</p:properties>
+<file path=customXml/itemProps2.xml><?xml version="1.0" encoding="utf-8"?>
+<ds:datastoreItem xmlns:ds="http://schemas.openxmlformats.org/officeDocument/2006/customXml" ds:itemID="{4387D90F-6BE3-4885-A9F7-DA895AA34ABA}">
+  <ds:schemaRefs>
+    <ds:schemaRef ds:uri="http://schemas.microsoft.com/sharepoint/v3/contenttype/forms"/>
+  </ds:schemaRefs>
+</ds:datastoreItem>
 </file>
 
-<file path=customXml/itemProps1.xml><?xml version="1.0" encoding="utf-8"?>
+<file path=customXml/itemProps3.xml><?xml version="1.0" encoding="utf-8"?>
 <ds:datastoreItem xmlns:ds="http://schemas.openxmlformats.org/officeDocument/2006/customXml" ds:itemID="{EA9ADF19-CB64-4721-8E58-B7C01F3819AD}">
   <ds:schemaRefs>
     <ds:schemaRef ds:uri="http://schemas.microsoft.com/office/2006/metadata/contentType"/>
@@ -12236,29 +14340,4 @@
     <ds:schemaRef ds:uri="http://schemas.microsoft.com/internal/obd"/>
   </ds:schemaRefs>
 </ds:datastoreItem>
-</file>
-
-<file path=customXml/itemProps2.xml><?xml version="1.0" encoding="utf-8"?>
-<ds:datastoreItem xmlns:ds="http://schemas.openxmlformats.org/officeDocument/2006/customXml" ds:itemID="{4387D90F-6BE3-4885-A9F7-DA895AA34ABA}">
-  <ds:schemaRefs>
-    <ds:schemaRef ds:uri="http://schemas.microsoft.com/sharepoint/v3/contenttype/forms"/>
-  </ds:schemaRefs>
-</ds:datastoreItem>
-</file>
-
-<file path=customXml/itemProps3.xml><?xml version="1.0" encoding="utf-8"?>
-<ds:datastoreItem xmlns:ds="http://schemas.openxmlformats.org/officeDocument/2006/customXml" ds:itemID="{03151227-4A3A-4E37-8E20-819026BD1323}">
-  <ds:schemaRefs>
-    <ds:schemaRef ds:uri="http://schemas.openxmlformats.org/package/2006/metadata/core-properties"/>
-    <ds:schemaRef ds:uri="http://purl.org/dc/terms/"/>
-    <ds:schemaRef ds:uri="http://schemas.microsoft.com/office/2006/metadata/properties"/>
-    <ds:schemaRef ds:uri="http://purl.org/dc/dcmitype/"/>
-    <ds:schemaRef ds:uri="416c5dfc-1efd-4b21-a4bc-b8850f7bb253"/>
-    <ds:schemaRef ds:uri="http://schemas.microsoft.com/office/2006/documentManagement/types"/>
-    <ds:schemaRef ds:uri="http://schemas.microsoft.com/office/infopath/2007/PartnerControls"/>
-    <ds:schemaRef ds:uri="3d1d779b-3ed4-468b-9ba2-fdda46887e73"/>
-    <ds:schemaRef ds:uri="http://www.w3.org/XML/1998/namespace"/>
-    <ds:schemaRef ds:uri="http://purl.org/dc/elements/1.1/"/>
-  </ds:schemaRefs>
-</ds:datastoreItem>
 </file>
</xml_diff>